<commit_message>
PPTX import: implement native handling of a color's luminance modulation
This was already handled in oox/ at import-time: this adds it to the doc
model, including UNO API and PPTX import.

This is a dependency PPTX export and UI.

Change-Id: I5d875b53d715beb10c13ef616d06cf958d43f70f
Reviewed-on: https://gerrit.libreoffice.org/c/core/+/125684
Reviewed-by: Miklos Vajna <vmiklos@collabora.com>
Tested-by: Jenkins
</commit_message>
<xml_diff>
--- a/oox/qa/unit/data/theme.pptx
+++ b/oox/qa/unit/data/theme.pptx
@@ -129,7 +129,7 @@
           <p:cNvPr id="2" name="Title 1">
             <a:extLst>
               <a:ext uri="{FF2B5EF4-FFF2-40B4-BE49-F238E27FC236}">
-                <a16:creationId xmlns:a16="http://schemas.microsoft.com/office/drawing/2014/main" id="{3A21D56C-A9D4-4388-8EA0-41867BEAE464}"/>
+                <a16:creationId xmlns:a16="http://schemas.microsoft.com/office/drawing/2014/main" id="{309EF673-080D-4A43-9C92-048240CEE4D2}"/>
               </a:ext>
             </a:extLst>
           </p:cNvPr>
@@ -166,7 +166,7 @@
           <p:cNvPr id="3" name="Subtitle 2">
             <a:extLst>
               <a:ext uri="{FF2B5EF4-FFF2-40B4-BE49-F238E27FC236}">
-                <a16:creationId xmlns:a16="http://schemas.microsoft.com/office/drawing/2014/main" id="{A3BDC343-07F5-43AC-82D5-BFADC6D20C75}"/>
+                <a16:creationId xmlns:a16="http://schemas.microsoft.com/office/drawing/2014/main" id="{4D169137-8FED-47CE-AFF2-838CFAF9450B}"/>
               </a:ext>
             </a:extLst>
           </p:cNvPr>
@@ -236,7 +236,7 @@
           <p:cNvPr id="4" name="Date Placeholder 3">
             <a:extLst>
               <a:ext uri="{FF2B5EF4-FFF2-40B4-BE49-F238E27FC236}">
-                <a16:creationId xmlns:a16="http://schemas.microsoft.com/office/drawing/2014/main" id="{AE05918F-B8DA-4AE1-A824-B0FFF35D54AE}"/>
+                <a16:creationId xmlns:a16="http://schemas.microsoft.com/office/drawing/2014/main" id="{7AF4A1F5-1638-4A0B-A253-B8338E0833FA}"/>
               </a:ext>
             </a:extLst>
           </p:cNvPr>
@@ -252,9 +252,9 @@
           <a:bodyPr/>
           <a:lstStyle/>
           <a:p>
-            <a:fld id="{69964482-7A28-46BB-911B-C4295E5B9189}" type="datetimeFigureOut">
+            <a:fld id="{0BB7F5F2-C89A-42B0-A48D-799E2B27853F}" type="datetimeFigureOut">
               <a:rPr lang="en-US" smtClean="0"/>
-              <a:t>11/19/2021</a:t>
+              <a:t>11/22/2021</a:t>
             </a:fld>
             <a:endParaRPr lang="en-US"/>
           </a:p>
@@ -265,7 +265,7 @@
           <p:cNvPr id="5" name="Footer Placeholder 4">
             <a:extLst>
               <a:ext uri="{FF2B5EF4-FFF2-40B4-BE49-F238E27FC236}">
-                <a16:creationId xmlns:a16="http://schemas.microsoft.com/office/drawing/2014/main" id="{1C04B918-5B4F-43C4-9603-2C346A3B76FB}"/>
+                <a16:creationId xmlns:a16="http://schemas.microsoft.com/office/drawing/2014/main" id="{0D8C821A-974B-460E-ABFE-4EE8BD908579}"/>
               </a:ext>
             </a:extLst>
           </p:cNvPr>
@@ -290,7 +290,7 @@
           <p:cNvPr id="6" name="Slide Number Placeholder 5">
             <a:extLst>
               <a:ext uri="{FF2B5EF4-FFF2-40B4-BE49-F238E27FC236}">
-                <a16:creationId xmlns:a16="http://schemas.microsoft.com/office/drawing/2014/main" id="{BA05D1FE-2B7D-4EF8-8402-07CDF8770D22}"/>
+                <a16:creationId xmlns:a16="http://schemas.microsoft.com/office/drawing/2014/main" id="{AC6078DE-40FE-41B3-A67F-D38FDE2CEC75}"/>
               </a:ext>
             </a:extLst>
           </p:cNvPr>
@@ -306,7 +306,7 @@
           <a:bodyPr/>
           <a:lstStyle/>
           <a:p>
-            <a:fld id="{49FB7405-2293-4647-B9E0-98495B39DEC9}" type="slidenum">
+            <a:fld id="{C189D780-3667-48AA-8D4E-FC9525966740}" type="slidenum">
               <a:rPr lang="en-US" smtClean="0"/>
               <a:t>‹#›</a:t>
             </a:fld>
@@ -317,7 +317,7 @@
     </p:spTree>
     <p:extLst>
       <p:ext uri="{BB962C8B-B14F-4D97-AF65-F5344CB8AC3E}">
-        <p14:creationId xmlns:p14="http://schemas.microsoft.com/office/powerpoint/2010/main" val="3138759097"/>
+        <p14:creationId xmlns:p14="http://schemas.microsoft.com/office/powerpoint/2010/main" val="4234878531"/>
       </p:ext>
     </p:extLst>
   </p:cSld>
@@ -349,7 +349,7 @@
           <p:cNvPr id="2" name="Title 1">
             <a:extLst>
               <a:ext uri="{FF2B5EF4-FFF2-40B4-BE49-F238E27FC236}">
-                <a16:creationId xmlns:a16="http://schemas.microsoft.com/office/drawing/2014/main" id="{A97711D2-6178-45AC-B828-B5A70CF0DFAE}"/>
+                <a16:creationId xmlns:a16="http://schemas.microsoft.com/office/drawing/2014/main" id="{66D3908B-7A76-4574-B834-153EBD008CC9}"/>
               </a:ext>
             </a:extLst>
           </p:cNvPr>
@@ -377,7 +377,7 @@
           <p:cNvPr id="3" name="Vertical Text Placeholder 2">
             <a:extLst>
               <a:ext uri="{FF2B5EF4-FFF2-40B4-BE49-F238E27FC236}">
-                <a16:creationId xmlns:a16="http://schemas.microsoft.com/office/drawing/2014/main" id="{5EF7CAF6-CFD9-486F-BFB6-550C77787FFC}"/>
+                <a16:creationId xmlns:a16="http://schemas.microsoft.com/office/drawing/2014/main" id="{A27DFB35-773D-45A7-B0D5-9D143D816253}"/>
               </a:ext>
             </a:extLst>
           </p:cNvPr>
@@ -434,7 +434,7 @@
           <p:cNvPr id="4" name="Date Placeholder 3">
             <a:extLst>
               <a:ext uri="{FF2B5EF4-FFF2-40B4-BE49-F238E27FC236}">
-                <a16:creationId xmlns:a16="http://schemas.microsoft.com/office/drawing/2014/main" id="{ED23C952-90C9-451B-8434-9AF3E6DB676A}"/>
+                <a16:creationId xmlns:a16="http://schemas.microsoft.com/office/drawing/2014/main" id="{571DDCD6-63AD-4428-AA0D-3706B6C3790D}"/>
               </a:ext>
             </a:extLst>
           </p:cNvPr>
@@ -450,9 +450,9 @@
           <a:bodyPr/>
           <a:lstStyle/>
           <a:p>
-            <a:fld id="{69964482-7A28-46BB-911B-C4295E5B9189}" type="datetimeFigureOut">
+            <a:fld id="{0BB7F5F2-C89A-42B0-A48D-799E2B27853F}" type="datetimeFigureOut">
               <a:rPr lang="en-US" smtClean="0"/>
-              <a:t>11/19/2021</a:t>
+              <a:t>11/22/2021</a:t>
             </a:fld>
             <a:endParaRPr lang="en-US"/>
           </a:p>
@@ -463,7 +463,7 @@
           <p:cNvPr id="5" name="Footer Placeholder 4">
             <a:extLst>
               <a:ext uri="{FF2B5EF4-FFF2-40B4-BE49-F238E27FC236}">
-                <a16:creationId xmlns:a16="http://schemas.microsoft.com/office/drawing/2014/main" id="{3CB536D8-EA89-4492-A6E0-6013DDA8F4ED}"/>
+                <a16:creationId xmlns:a16="http://schemas.microsoft.com/office/drawing/2014/main" id="{982A57E1-AD2A-4D7D-8F64-B0994FE8D5F9}"/>
               </a:ext>
             </a:extLst>
           </p:cNvPr>
@@ -488,7 +488,7 @@
           <p:cNvPr id="6" name="Slide Number Placeholder 5">
             <a:extLst>
               <a:ext uri="{FF2B5EF4-FFF2-40B4-BE49-F238E27FC236}">
-                <a16:creationId xmlns:a16="http://schemas.microsoft.com/office/drawing/2014/main" id="{854F0AD2-FB8F-473A-8CC0-EEA8AB8D55EC}"/>
+                <a16:creationId xmlns:a16="http://schemas.microsoft.com/office/drawing/2014/main" id="{F588EB23-B1B8-491E-A20B-55880051BBD4}"/>
               </a:ext>
             </a:extLst>
           </p:cNvPr>
@@ -504,7 +504,7 @@
           <a:bodyPr/>
           <a:lstStyle/>
           <a:p>
-            <a:fld id="{49FB7405-2293-4647-B9E0-98495B39DEC9}" type="slidenum">
+            <a:fld id="{C189D780-3667-48AA-8D4E-FC9525966740}" type="slidenum">
               <a:rPr lang="en-US" smtClean="0"/>
               <a:t>‹#›</a:t>
             </a:fld>
@@ -515,7 +515,7 @@
     </p:spTree>
     <p:extLst>
       <p:ext uri="{BB962C8B-B14F-4D97-AF65-F5344CB8AC3E}">
-        <p14:creationId xmlns:p14="http://schemas.microsoft.com/office/powerpoint/2010/main" val="2162544043"/>
+        <p14:creationId xmlns:p14="http://schemas.microsoft.com/office/powerpoint/2010/main" val="3110700263"/>
       </p:ext>
     </p:extLst>
   </p:cSld>
@@ -547,7 +547,7 @@
           <p:cNvPr id="2" name="Vertical Title 1">
             <a:extLst>
               <a:ext uri="{FF2B5EF4-FFF2-40B4-BE49-F238E27FC236}">
-                <a16:creationId xmlns:a16="http://schemas.microsoft.com/office/drawing/2014/main" id="{D4B7694A-284A-4B8D-BE45-60CD0BE0AE78}"/>
+                <a16:creationId xmlns:a16="http://schemas.microsoft.com/office/drawing/2014/main" id="{5E02A0A0-C8E6-44DD-ACB8-62AA3C8DFBF1}"/>
               </a:ext>
             </a:extLst>
           </p:cNvPr>
@@ -580,7 +580,7 @@
           <p:cNvPr id="3" name="Vertical Text Placeholder 2">
             <a:extLst>
               <a:ext uri="{FF2B5EF4-FFF2-40B4-BE49-F238E27FC236}">
-                <a16:creationId xmlns:a16="http://schemas.microsoft.com/office/drawing/2014/main" id="{2B049BEA-972E-4FB6-8F53-C249B7E154E5}"/>
+                <a16:creationId xmlns:a16="http://schemas.microsoft.com/office/drawing/2014/main" id="{6B515597-9B94-4A54-83B2-7A65612B204B}"/>
               </a:ext>
             </a:extLst>
           </p:cNvPr>
@@ -642,7 +642,7 @@
           <p:cNvPr id="4" name="Date Placeholder 3">
             <a:extLst>
               <a:ext uri="{FF2B5EF4-FFF2-40B4-BE49-F238E27FC236}">
-                <a16:creationId xmlns:a16="http://schemas.microsoft.com/office/drawing/2014/main" id="{678C1185-7932-4398-A62A-C52E1F2B49EF}"/>
+                <a16:creationId xmlns:a16="http://schemas.microsoft.com/office/drawing/2014/main" id="{F74938ED-2489-4672-9964-486B782D132D}"/>
               </a:ext>
             </a:extLst>
           </p:cNvPr>
@@ -658,9 +658,9 @@
           <a:bodyPr/>
           <a:lstStyle/>
           <a:p>
-            <a:fld id="{69964482-7A28-46BB-911B-C4295E5B9189}" type="datetimeFigureOut">
+            <a:fld id="{0BB7F5F2-C89A-42B0-A48D-799E2B27853F}" type="datetimeFigureOut">
               <a:rPr lang="en-US" smtClean="0"/>
-              <a:t>11/19/2021</a:t>
+              <a:t>11/22/2021</a:t>
             </a:fld>
             <a:endParaRPr lang="en-US"/>
           </a:p>
@@ -671,7 +671,7 @@
           <p:cNvPr id="5" name="Footer Placeholder 4">
             <a:extLst>
               <a:ext uri="{FF2B5EF4-FFF2-40B4-BE49-F238E27FC236}">
-                <a16:creationId xmlns:a16="http://schemas.microsoft.com/office/drawing/2014/main" id="{C0102819-2223-4E72-9360-50426E8D685F}"/>
+                <a16:creationId xmlns:a16="http://schemas.microsoft.com/office/drawing/2014/main" id="{0DEA2D7C-2B96-42BC-B920-AD65CB458569}"/>
               </a:ext>
             </a:extLst>
           </p:cNvPr>
@@ -696,7 +696,7 @@
           <p:cNvPr id="6" name="Slide Number Placeholder 5">
             <a:extLst>
               <a:ext uri="{FF2B5EF4-FFF2-40B4-BE49-F238E27FC236}">
-                <a16:creationId xmlns:a16="http://schemas.microsoft.com/office/drawing/2014/main" id="{BFB84628-B4B3-42EE-B29D-1C577F51338D}"/>
+                <a16:creationId xmlns:a16="http://schemas.microsoft.com/office/drawing/2014/main" id="{6F147FE1-CBBC-4314-A29E-43EB12952FE2}"/>
               </a:ext>
             </a:extLst>
           </p:cNvPr>
@@ -712,7 +712,7 @@
           <a:bodyPr/>
           <a:lstStyle/>
           <a:p>
-            <a:fld id="{49FB7405-2293-4647-B9E0-98495B39DEC9}" type="slidenum">
+            <a:fld id="{C189D780-3667-48AA-8D4E-FC9525966740}" type="slidenum">
               <a:rPr lang="en-US" smtClean="0"/>
               <a:t>‹#›</a:t>
             </a:fld>
@@ -723,7 +723,7 @@
     </p:spTree>
     <p:extLst>
       <p:ext uri="{BB962C8B-B14F-4D97-AF65-F5344CB8AC3E}">
-        <p14:creationId xmlns:p14="http://schemas.microsoft.com/office/powerpoint/2010/main" val="1384846300"/>
+        <p14:creationId xmlns:p14="http://schemas.microsoft.com/office/powerpoint/2010/main" val="3605737135"/>
       </p:ext>
     </p:extLst>
   </p:cSld>
@@ -755,7 +755,7 @@
           <p:cNvPr id="2" name="Title 1">
             <a:extLst>
               <a:ext uri="{FF2B5EF4-FFF2-40B4-BE49-F238E27FC236}">
-                <a16:creationId xmlns:a16="http://schemas.microsoft.com/office/drawing/2014/main" id="{D727F5FF-9AF5-4257-AC38-5FD38C0A2E84}"/>
+                <a16:creationId xmlns:a16="http://schemas.microsoft.com/office/drawing/2014/main" id="{386DBADF-D626-4DDA-8924-890E7754AF5D}"/>
               </a:ext>
             </a:extLst>
           </p:cNvPr>
@@ -783,7 +783,7 @@
           <p:cNvPr id="3" name="Content Placeholder 2">
             <a:extLst>
               <a:ext uri="{FF2B5EF4-FFF2-40B4-BE49-F238E27FC236}">
-                <a16:creationId xmlns:a16="http://schemas.microsoft.com/office/drawing/2014/main" id="{DB8ACA4B-2F89-47C2-9461-7BB777BE4373}"/>
+                <a16:creationId xmlns:a16="http://schemas.microsoft.com/office/drawing/2014/main" id="{BBF623BB-729D-4CB8-BD8D-E9BEB738A476}"/>
               </a:ext>
             </a:extLst>
           </p:cNvPr>
@@ -840,7 +840,7 @@
           <p:cNvPr id="4" name="Date Placeholder 3">
             <a:extLst>
               <a:ext uri="{FF2B5EF4-FFF2-40B4-BE49-F238E27FC236}">
-                <a16:creationId xmlns:a16="http://schemas.microsoft.com/office/drawing/2014/main" id="{BF74D835-3D5B-4847-813E-EF9328B661EC}"/>
+                <a16:creationId xmlns:a16="http://schemas.microsoft.com/office/drawing/2014/main" id="{A7058C4F-6E39-46B7-966D-C0B4374E400C}"/>
               </a:ext>
             </a:extLst>
           </p:cNvPr>
@@ -856,9 +856,9 @@
           <a:bodyPr/>
           <a:lstStyle/>
           <a:p>
-            <a:fld id="{69964482-7A28-46BB-911B-C4295E5B9189}" type="datetimeFigureOut">
+            <a:fld id="{0BB7F5F2-C89A-42B0-A48D-799E2B27853F}" type="datetimeFigureOut">
               <a:rPr lang="en-US" smtClean="0"/>
-              <a:t>11/19/2021</a:t>
+              <a:t>11/22/2021</a:t>
             </a:fld>
             <a:endParaRPr lang="en-US"/>
           </a:p>
@@ -869,7 +869,7 @@
           <p:cNvPr id="5" name="Footer Placeholder 4">
             <a:extLst>
               <a:ext uri="{FF2B5EF4-FFF2-40B4-BE49-F238E27FC236}">
-                <a16:creationId xmlns:a16="http://schemas.microsoft.com/office/drawing/2014/main" id="{B69CA5FC-07F8-4000-AD5F-0B584DFC51F9}"/>
+                <a16:creationId xmlns:a16="http://schemas.microsoft.com/office/drawing/2014/main" id="{CAD95E6C-301F-4DB0-A80B-34DEAD1B218C}"/>
               </a:ext>
             </a:extLst>
           </p:cNvPr>
@@ -894,7 +894,7 @@
           <p:cNvPr id="6" name="Slide Number Placeholder 5">
             <a:extLst>
               <a:ext uri="{FF2B5EF4-FFF2-40B4-BE49-F238E27FC236}">
-                <a16:creationId xmlns:a16="http://schemas.microsoft.com/office/drawing/2014/main" id="{358AEDD1-1B57-4A48-A920-8404A1507160}"/>
+                <a16:creationId xmlns:a16="http://schemas.microsoft.com/office/drawing/2014/main" id="{7C40A4BA-DCD3-4AFD-903B-266025559DD5}"/>
               </a:ext>
             </a:extLst>
           </p:cNvPr>
@@ -910,7 +910,7 @@
           <a:bodyPr/>
           <a:lstStyle/>
           <a:p>
-            <a:fld id="{49FB7405-2293-4647-B9E0-98495B39DEC9}" type="slidenum">
+            <a:fld id="{C189D780-3667-48AA-8D4E-FC9525966740}" type="slidenum">
               <a:rPr lang="en-US" smtClean="0"/>
               <a:t>‹#›</a:t>
             </a:fld>
@@ -921,7 +921,7 @@
     </p:spTree>
     <p:extLst>
       <p:ext uri="{BB962C8B-B14F-4D97-AF65-F5344CB8AC3E}">
-        <p14:creationId xmlns:p14="http://schemas.microsoft.com/office/powerpoint/2010/main" val="4934791"/>
+        <p14:creationId xmlns:p14="http://schemas.microsoft.com/office/powerpoint/2010/main" val="472460318"/>
       </p:ext>
     </p:extLst>
   </p:cSld>
@@ -953,7 +953,7 @@
           <p:cNvPr id="2" name="Title 1">
             <a:extLst>
               <a:ext uri="{FF2B5EF4-FFF2-40B4-BE49-F238E27FC236}">
-                <a16:creationId xmlns:a16="http://schemas.microsoft.com/office/drawing/2014/main" id="{B84BC515-A900-4727-B3B3-D4FC0A61DF7D}"/>
+                <a16:creationId xmlns:a16="http://schemas.microsoft.com/office/drawing/2014/main" id="{E35561FE-BA64-4F2A-93D8-87849242EE7D}"/>
               </a:ext>
             </a:extLst>
           </p:cNvPr>
@@ -990,7 +990,7 @@
           <p:cNvPr id="3" name="Text Placeholder 2">
             <a:extLst>
               <a:ext uri="{FF2B5EF4-FFF2-40B4-BE49-F238E27FC236}">
-                <a16:creationId xmlns:a16="http://schemas.microsoft.com/office/drawing/2014/main" id="{A9B6A6CC-FB8E-48CE-A382-B409E1402AE3}"/>
+                <a16:creationId xmlns:a16="http://schemas.microsoft.com/office/drawing/2014/main" id="{42573C78-9414-49C4-A034-D4C1FA1EF11C}"/>
               </a:ext>
             </a:extLst>
           </p:cNvPr>
@@ -1115,7 +1115,7 @@
           <p:cNvPr id="4" name="Date Placeholder 3">
             <a:extLst>
               <a:ext uri="{FF2B5EF4-FFF2-40B4-BE49-F238E27FC236}">
-                <a16:creationId xmlns:a16="http://schemas.microsoft.com/office/drawing/2014/main" id="{AA4ADF8A-17EF-4914-B01E-B7A064AF5755}"/>
+                <a16:creationId xmlns:a16="http://schemas.microsoft.com/office/drawing/2014/main" id="{D75A6D7E-5BF3-46E3-94A8-F0745E2627D2}"/>
               </a:ext>
             </a:extLst>
           </p:cNvPr>
@@ -1131,9 +1131,9 @@
           <a:bodyPr/>
           <a:lstStyle/>
           <a:p>
-            <a:fld id="{69964482-7A28-46BB-911B-C4295E5B9189}" type="datetimeFigureOut">
+            <a:fld id="{0BB7F5F2-C89A-42B0-A48D-799E2B27853F}" type="datetimeFigureOut">
               <a:rPr lang="en-US" smtClean="0"/>
-              <a:t>11/19/2021</a:t>
+              <a:t>11/22/2021</a:t>
             </a:fld>
             <a:endParaRPr lang="en-US"/>
           </a:p>
@@ -1144,7 +1144,7 @@
           <p:cNvPr id="5" name="Footer Placeholder 4">
             <a:extLst>
               <a:ext uri="{FF2B5EF4-FFF2-40B4-BE49-F238E27FC236}">
-                <a16:creationId xmlns:a16="http://schemas.microsoft.com/office/drawing/2014/main" id="{5CE9D4ED-08C3-45EC-A328-4725047CCB7D}"/>
+                <a16:creationId xmlns:a16="http://schemas.microsoft.com/office/drawing/2014/main" id="{9B44AC51-B7E5-4F45-8742-7B02C53C2953}"/>
               </a:ext>
             </a:extLst>
           </p:cNvPr>
@@ -1169,7 +1169,7 @@
           <p:cNvPr id="6" name="Slide Number Placeholder 5">
             <a:extLst>
               <a:ext uri="{FF2B5EF4-FFF2-40B4-BE49-F238E27FC236}">
-                <a16:creationId xmlns:a16="http://schemas.microsoft.com/office/drawing/2014/main" id="{3C6E43E2-5B18-4040-9648-9C00AA31EBF0}"/>
+                <a16:creationId xmlns:a16="http://schemas.microsoft.com/office/drawing/2014/main" id="{8A3D7F44-FEFB-4D52-B12C-ECDAFD4238F4}"/>
               </a:ext>
             </a:extLst>
           </p:cNvPr>
@@ -1185,7 +1185,7 @@
           <a:bodyPr/>
           <a:lstStyle/>
           <a:p>
-            <a:fld id="{49FB7405-2293-4647-B9E0-98495B39DEC9}" type="slidenum">
+            <a:fld id="{C189D780-3667-48AA-8D4E-FC9525966740}" type="slidenum">
               <a:rPr lang="en-US" smtClean="0"/>
               <a:t>‹#›</a:t>
             </a:fld>
@@ -1196,7 +1196,7 @@
     </p:spTree>
     <p:extLst>
       <p:ext uri="{BB962C8B-B14F-4D97-AF65-F5344CB8AC3E}">
-        <p14:creationId xmlns:p14="http://schemas.microsoft.com/office/powerpoint/2010/main" val="3609481017"/>
+        <p14:creationId xmlns:p14="http://schemas.microsoft.com/office/powerpoint/2010/main" val="2139187561"/>
       </p:ext>
     </p:extLst>
   </p:cSld>
@@ -1228,7 +1228,7 @@
           <p:cNvPr id="2" name="Title 1">
             <a:extLst>
               <a:ext uri="{FF2B5EF4-FFF2-40B4-BE49-F238E27FC236}">
-                <a16:creationId xmlns:a16="http://schemas.microsoft.com/office/drawing/2014/main" id="{29996429-1860-46CD-85FC-D5A7D0DAFFDF}"/>
+                <a16:creationId xmlns:a16="http://schemas.microsoft.com/office/drawing/2014/main" id="{3E79FB39-07E2-4D98-89A9-2CB6CD71E58D}"/>
               </a:ext>
             </a:extLst>
           </p:cNvPr>
@@ -1256,7 +1256,7 @@
           <p:cNvPr id="3" name="Content Placeholder 2">
             <a:extLst>
               <a:ext uri="{FF2B5EF4-FFF2-40B4-BE49-F238E27FC236}">
-                <a16:creationId xmlns:a16="http://schemas.microsoft.com/office/drawing/2014/main" id="{55B7C0FD-1B1C-41FB-9954-A8596AB62554}"/>
+                <a16:creationId xmlns:a16="http://schemas.microsoft.com/office/drawing/2014/main" id="{C01C848F-192F-4FD8-83C6-C81754FA8980}"/>
               </a:ext>
             </a:extLst>
           </p:cNvPr>
@@ -1318,7 +1318,7 @@
           <p:cNvPr id="4" name="Content Placeholder 3">
             <a:extLst>
               <a:ext uri="{FF2B5EF4-FFF2-40B4-BE49-F238E27FC236}">
-                <a16:creationId xmlns:a16="http://schemas.microsoft.com/office/drawing/2014/main" id="{D6BB1D0D-36AD-4913-A81F-AEDAB29D6353}"/>
+                <a16:creationId xmlns:a16="http://schemas.microsoft.com/office/drawing/2014/main" id="{12B58396-AED6-48B4-923A-3B269836836F}"/>
               </a:ext>
             </a:extLst>
           </p:cNvPr>
@@ -1380,7 +1380,7 @@
           <p:cNvPr id="5" name="Date Placeholder 4">
             <a:extLst>
               <a:ext uri="{FF2B5EF4-FFF2-40B4-BE49-F238E27FC236}">
-                <a16:creationId xmlns:a16="http://schemas.microsoft.com/office/drawing/2014/main" id="{8BEF7DB8-1F2B-4AE5-B6D6-B67A3D3F01CA}"/>
+                <a16:creationId xmlns:a16="http://schemas.microsoft.com/office/drawing/2014/main" id="{5F929472-52DF-45A1-9A07-7012BC281564}"/>
               </a:ext>
             </a:extLst>
           </p:cNvPr>
@@ -1396,9 +1396,9 @@
           <a:bodyPr/>
           <a:lstStyle/>
           <a:p>
-            <a:fld id="{69964482-7A28-46BB-911B-C4295E5B9189}" type="datetimeFigureOut">
+            <a:fld id="{0BB7F5F2-C89A-42B0-A48D-799E2B27853F}" type="datetimeFigureOut">
               <a:rPr lang="en-US" smtClean="0"/>
-              <a:t>11/19/2021</a:t>
+              <a:t>11/22/2021</a:t>
             </a:fld>
             <a:endParaRPr lang="en-US"/>
           </a:p>
@@ -1409,7 +1409,7 @@
           <p:cNvPr id="6" name="Footer Placeholder 5">
             <a:extLst>
               <a:ext uri="{FF2B5EF4-FFF2-40B4-BE49-F238E27FC236}">
-                <a16:creationId xmlns:a16="http://schemas.microsoft.com/office/drawing/2014/main" id="{B7C61B75-C38F-4E8E-8787-B42BB540F42B}"/>
+                <a16:creationId xmlns:a16="http://schemas.microsoft.com/office/drawing/2014/main" id="{D82B1772-7891-4961-88F5-7E7FCCCE7606}"/>
               </a:ext>
             </a:extLst>
           </p:cNvPr>
@@ -1434,7 +1434,7 @@
           <p:cNvPr id="7" name="Slide Number Placeholder 6">
             <a:extLst>
               <a:ext uri="{FF2B5EF4-FFF2-40B4-BE49-F238E27FC236}">
-                <a16:creationId xmlns:a16="http://schemas.microsoft.com/office/drawing/2014/main" id="{4F52F355-DF72-442A-989F-AD112D5A9E8A}"/>
+                <a16:creationId xmlns:a16="http://schemas.microsoft.com/office/drawing/2014/main" id="{03097F0F-6F67-409E-A1A0-3C00E77AD410}"/>
               </a:ext>
             </a:extLst>
           </p:cNvPr>
@@ -1450,7 +1450,7 @@
           <a:bodyPr/>
           <a:lstStyle/>
           <a:p>
-            <a:fld id="{49FB7405-2293-4647-B9E0-98495B39DEC9}" type="slidenum">
+            <a:fld id="{C189D780-3667-48AA-8D4E-FC9525966740}" type="slidenum">
               <a:rPr lang="en-US" smtClean="0"/>
               <a:t>‹#›</a:t>
             </a:fld>
@@ -1461,7 +1461,7 @@
     </p:spTree>
     <p:extLst>
       <p:ext uri="{BB962C8B-B14F-4D97-AF65-F5344CB8AC3E}">
-        <p14:creationId xmlns:p14="http://schemas.microsoft.com/office/powerpoint/2010/main" val="3333836776"/>
+        <p14:creationId xmlns:p14="http://schemas.microsoft.com/office/powerpoint/2010/main" val="2127556494"/>
       </p:ext>
     </p:extLst>
   </p:cSld>
@@ -1493,7 +1493,7 @@
           <p:cNvPr id="2" name="Title 1">
             <a:extLst>
               <a:ext uri="{FF2B5EF4-FFF2-40B4-BE49-F238E27FC236}">
-                <a16:creationId xmlns:a16="http://schemas.microsoft.com/office/drawing/2014/main" id="{E92C5D47-89FD-4DD2-AC0B-DA88540D2C36}"/>
+                <a16:creationId xmlns:a16="http://schemas.microsoft.com/office/drawing/2014/main" id="{6EB9FAF4-150B-41CB-BE33-5B37767861DE}"/>
               </a:ext>
             </a:extLst>
           </p:cNvPr>
@@ -1526,7 +1526,7 @@
           <p:cNvPr id="3" name="Text Placeholder 2">
             <a:extLst>
               <a:ext uri="{FF2B5EF4-FFF2-40B4-BE49-F238E27FC236}">
-                <a16:creationId xmlns:a16="http://schemas.microsoft.com/office/drawing/2014/main" id="{78A5BA5E-8116-422A-AFC9-51ED65A86CB6}"/>
+                <a16:creationId xmlns:a16="http://schemas.microsoft.com/office/drawing/2014/main" id="{ABBAEC65-4B9B-499C-84B1-A0FCFE413B68}"/>
               </a:ext>
             </a:extLst>
           </p:cNvPr>
@@ -1597,7 +1597,7 @@
           <p:cNvPr id="4" name="Content Placeholder 3">
             <a:extLst>
               <a:ext uri="{FF2B5EF4-FFF2-40B4-BE49-F238E27FC236}">
-                <a16:creationId xmlns:a16="http://schemas.microsoft.com/office/drawing/2014/main" id="{87E94CFF-6583-45CF-99F6-3A94644B191A}"/>
+                <a16:creationId xmlns:a16="http://schemas.microsoft.com/office/drawing/2014/main" id="{1197C06D-9EDE-4841-89F3-B2738811EB20}"/>
               </a:ext>
             </a:extLst>
           </p:cNvPr>
@@ -1659,7 +1659,7 @@
           <p:cNvPr id="5" name="Text Placeholder 4">
             <a:extLst>
               <a:ext uri="{FF2B5EF4-FFF2-40B4-BE49-F238E27FC236}">
-                <a16:creationId xmlns:a16="http://schemas.microsoft.com/office/drawing/2014/main" id="{91C783C8-6306-443C-BD76-8CD452D38A17}"/>
+                <a16:creationId xmlns:a16="http://schemas.microsoft.com/office/drawing/2014/main" id="{6D06999B-468B-4637-9469-C8955765AE28}"/>
               </a:ext>
             </a:extLst>
           </p:cNvPr>
@@ -1730,7 +1730,7 @@
           <p:cNvPr id="6" name="Content Placeholder 5">
             <a:extLst>
               <a:ext uri="{FF2B5EF4-FFF2-40B4-BE49-F238E27FC236}">
-                <a16:creationId xmlns:a16="http://schemas.microsoft.com/office/drawing/2014/main" id="{D85931E2-EB44-45E0-8E04-8DA4CE4189CF}"/>
+                <a16:creationId xmlns:a16="http://schemas.microsoft.com/office/drawing/2014/main" id="{EF60EC95-7A96-4E87-A5D1-24C2FA4E078E}"/>
               </a:ext>
             </a:extLst>
           </p:cNvPr>
@@ -1792,7 +1792,7 @@
           <p:cNvPr id="7" name="Date Placeholder 6">
             <a:extLst>
               <a:ext uri="{FF2B5EF4-FFF2-40B4-BE49-F238E27FC236}">
-                <a16:creationId xmlns:a16="http://schemas.microsoft.com/office/drawing/2014/main" id="{3041C1E0-6B25-4375-A482-D906F60B6BC3}"/>
+                <a16:creationId xmlns:a16="http://schemas.microsoft.com/office/drawing/2014/main" id="{30EA0D15-A2DD-4C1F-8AA8-B03FC9151A4C}"/>
               </a:ext>
             </a:extLst>
           </p:cNvPr>
@@ -1808,9 +1808,9 @@
           <a:bodyPr/>
           <a:lstStyle/>
           <a:p>
-            <a:fld id="{69964482-7A28-46BB-911B-C4295E5B9189}" type="datetimeFigureOut">
+            <a:fld id="{0BB7F5F2-C89A-42B0-A48D-799E2B27853F}" type="datetimeFigureOut">
               <a:rPr lang="en-US" smtClean="0"/>
-              <a:t>11/19/2021</a:t>
+              <a:t>11/22/2021</a:t>
             </a:fld>
             <a:endParaRPr lang="en-US"/>
           </a:p>
@@ -1821,7 +1821,7 @@
           <p:cNvPr id="8" name="Footer Placeholder 7">
             <a:extLst>
               <a:ext uri="{FF2B5EF4-FFF2-40B4-BE49-F238E27FC236}">
-                <a16:creationId xmlns:a16="http://schemas.microsoft.com/office/drawing/2014/main" id="{D23532F7-D0D5-4685-915C-78034F5FA7D6}"/>
+                <a16:creationId xmlns:a16="http://schemas.microsoft.com/office/drawing/2014/main" id="{28D8E322-F472-45C4-B997-9D12ACCCFB4F}"/>
               </a:ext>
             </a:extLst>
           </p:cNvPr>
@@ -1846,7 +1846,7 @@
           <p:cNvPr id="9" name="Slide Number Placeholder 8">
             <a:extLst>
               <a:ext uri="{FF2B5EF4-FFF2-40B4-BE49-F238E27FC236}">
-                <a16:creationId xmlns:a16="http://schemas.microsoft.com/office/drawing/2014/main" id="{39A32FBD-4BB0-432C-BB96-A603CC56DDC4}"/>
+                <a16:creationId xmlns:a16="http://schemas.microsoft.com/office/drawing/2014/main" id="{4C738189-4C72-440B-98A1-7E858C38CED1}"/>
               </a:ext>
             </a:extLst>
           </p:cNvPr>
@@ -1862,7 +1862,7 @@
           <a:bodyPr/>
           <a:lstStyle/>
           <a:p>
-            <a:fld id="{49FB7405-2293-4647-B9E0-98495B39DEC9}" type="slidenum">
+            <a:fld id="{C189D780-3667-48AA-8D4E-FC9525966740}" type="slidenum">
               <a:rPr lang="en-US" smtClean="0"/>
               <a:t>‹#›</a:t>
             </a:fld>
@@ -1873,7 +1873,7 @@
     </p:spTree>
     <p:extLst>
       <p:ext uri="{BB962C8B-B14F-4D97-AF65-F5344CB8AC3E}">
-        <p14:creationId xmlns:p14="http://schemas.microsoft.com/office/powerpoint/2010/main" val="1926711790"/>
+        <p14:creationId xmlns:p14="http://schemas.microsoft.com/office/powerpoint/2010/main" val="616357586"/>
       </p:ext>
     </p:extLst>
   </p:cSld>
@@ -1905,7 +1905,7 @@
           <p:cNvPr id="2" name="Title 1">
             <a:extLst>
               <a:ext uri="{FF2B5EF4-FFF2-40B4-BE49-F238E27FC236}">
-                <a16:creationId xmlns:a16="http://schemas.microsoft.com/office/drawing/2014/main" id="{7B15438D-20D1-46D2-81DC-69D9BD008606}"/>
+                <a16:creationId xmlns:a16="http://schemas.microsoft.com/office/drawing/2014/main" id="{C11F8311-9F2E-49C0-8179-3105F4D2D774}"/>
               </a:ext>
             </a:extLst>
           </p:cNvPr>
@@ -1933,7 +1933,7 @@
           <p:cNvPr id="3" name="Date Placeholder 2">
             <a:extLst>
               <a:ext uri="{FF2B5EF4-FFF2-40B4-BE49-F238E27FC236}">
-                <a16:creationId xmlns:a16="http://schemas.microsoft.com/office/drawing/2014/main" id="{A7E9FC82-3B5B-469D-8ABD-2A3B8515B19A}"/>
+                <a16:creationId xmlns:a16="http://schemas.microsoft.com/office/drawing/2014/main" id="{D02790B8-16D1-4BC7-9BC2-A430D4056E0B}"/>
               </a:ext>
             </a:extLst>
           </p:cNvPr>
@@ -1949,9 +1949,9 @@
           <a:bodyPr/>
           <a:lstStyle/>
           <a:p>
-            <a:fld id="{69964482-7A28-46BB-911B-C4295E5B9189}" type="datetimeFigureOut">
+            <a:fld id="{0BB7F5F2-C89A-42B0-A48D-799E2B27853F}" type="datetimeFigureOut">
               <a:rPr lang="en-US" smtClean="0"/>
-              <a:t>11/19/2021</a:t>
+              <a:t>11/22/2021</a:t>
             </a:fld>
             <a:endParaRPr lang="en-US"/>
           </a:p>
@@ -1962,7 +1962,7 @@
           <p:cNvPr id="4" name="Footer Placeholder 3">
             <a:extLst>
               <a:ext uri="{FF2B5EF4-FFF2-40B4-BE49-F238E27FC236}">
-                <a16:creationId xmlns:a16="http://schemas.microsoft.com/office/drawing/2014/main" id="{20F3779E-FBC1-419B-9E28-6DBC2CD489BE}"/>
+                <a16:creationId xmlns:a16="http://schemas.microsoft.com/office/drawing/2014/main" id="{FDA0C6A1-B5FE-49DA-9166-18E9E44F422B}"/>
               </a:ext>
             </a:extLst>
           </p:cNvPr>
@@ -1987,7 +1987,7 @@
           <p:cNvPr id="5" name="Slide Number Placeholder 4">
             <a:extLst>
               <a:ext uri="{FF2B5EF4-FFF2-40B4-BE49-F238E27FC236}">
-                <a16:creationId xmlns:a16="http://schemas.microsoft.com/office/drawing/2014/main" id="{C173FFF6-2AD6-4203-9C62-082928FFDE2A}"/>
+                <a16:creationId xmlns:a16="http://schemas.microsoft.com/office/drawing/2014/main" id="{B0072B52-594A-46C0-B149-6BB5D6C7E7FA}"/>
               </a:ext>
             </a:extLst>
           </p:cNvPr>
@@ -2003,7 +2003,7 @@
           <a:bodyPr/>
           <a:lstStyle/>
           <a:p>
-            <a:fld id="{49FB7405-2293-4647-B9E0-98495B39DEC9}" type="slidenum">
+            <a:fld id="{C189D780-3667-48AA-8D4E-FC9525966740}" type="slidenum">
               <a:rPr lang="en-US" smtClean="0"/>
               <a:t>‹#›</a:t>
             </a:fld>
@@ -2014,7 +2014,7 @@
     </p:spTree>
     <p:extLst>
       <p:ext uri="{BB962C8B-B14F-4D97-AF65-F5344CB8AC3E}">
-        <p14:creationId xmlns:p14="http://schemas.microsoft.com/office/powerpoint/2010/main" val="3762718658"/>
+        <p14:creationId xmlns:p14="http://schemas.microsoft.com/office/powerpoint/2010/main" val="4282277206"/>
       </p:ext>
     </p:extLst>
   </p:cSld>
@@ -2046,7 +2046,7 @@
           <p:cNvPr id="2" name="Date Placeholder 1">
             <a:extLst>
               <a:ext uri="{FF2B5EF4-FFF2-40B4-BE49-F238E27FC236}">
-                <a16:creationId xmlns:a16="http://schemas.microsoft.com/office/drawing/2014/main" id="{D147E5B5-F359-47AF-8702-CE4173679049}"/>
+                <a16:creationId xmlns:a16="http://schemas.microsoft.com/office/drawing/2014/main" id="{239A3526-F341-4307-97E2-59E81D0B32E9}"/>
               </a:ext>
             </a:extLst>
           </p:cNvPr>
@@ -2062,9 +2062,9 @@
           <a:bodyPr/>
           <a:lstStyle/>
           <a:p>
-            <a:fld id="{69964482-7A28-46BB-911B-C4295E5B9189}" type="datetimeFigureOut">
+            <a:fld id="{0BB7F5F2-C89A-42B0-A48D-799E2B27853F}" type="datetimeFigureOut">
               <a:rPr lang="en-US" smtClean="0"/>
-              <a:t>11/19/2021</a:t>
+              <a:t>11/22/2021</a:t>
             </a:fld>
             <a:endParaRPr lang="en-US"/>
           </a:p>
@@ -2075,7 +2075,7 @@
           <p:cNvPr id="3" name="Footer Placeholder 2">
             <a:extLst>
               <a:ext uri="{FF2B5EF4-FFF2-40B4-BE49-F238E27FC236}">
-                <a16:creationId xmlns:a16="http://schemas.microsoft.com/office/drawing/2014/main" id="{CD1B6C24-5DFE-41DB-9CCE-72928F904EAB}"/>
+                <a16:creationId xmlns:a16="http://schemas.microsoft.com/office/drawing/2014/main" id="{5C8504D9-712F-4FFF-8068-5765549B2A65}"/>
               </a:ext>
             </a:extLst>
           </p:cNvPr>
@@ -2100,7 +2100,7 @@
           <p:cNvPr id="4" name="Slide Number Placeholder 3">
             <a:extLst>
               <a:ext uri="{FF2B5EF4-FFF2-40B4-BE49-F238E27FC236}">
-                <a16:creationId xmlns:a16="http://schemas.microsoft.com/office/drawing/2014/main" id="{2BB542AE-6968-40A4-9740-9F632D25FCF8}"/>
+                <a16:creationId xmlns:a16="http://schemas.microsoft.com/office/drawing/2014/main" id="{E1B5C0C2-8C32-4379-8929-2DE81B1EEF2E}"/>
               </a:ext>
             </a:extLst>
           </p:cNvPr>
@@ -2116,7 +2116,7 @@
           <a:bodyPr/>
           <a:lstStyle/>
           <a:p>
-            <a:fld id="{49FB7405-2293-4647-B9E0-98495B39DEC9}" type="slidenum">
+            <a:fld id="{C189D780-3667-48AA-8D4E-FC9525966740}" type="slidenum">
               <a:rPr lang="en-US" smtClean="0"/>
               <a:t>‹#›</a:t>
             </a:fld>
@@ -2127,7 +2127,7 @@
     </p:spTree>
     <p:extLst>
       <p:ext uri="{BB962C8B-B14F-4D97-AF65-F5344CB8AC3E}">
-        <p14:creationId xmlns:p14="http://schemas.microsoft.com/office/powerpoint/2010/main" val="2117251399"/>
+        <p14:creationId xmlns:p14="http://schemas.microsoft.com/office/powerpoint/2010/main" val="489045608"/>
       </p:ext>
     </p:extLst>
   </p:cSld>
@@ -2159,7 +2159,7 @@
           <p:cNvPr id="2" name="Title 1">
             <a:extLst>
               <a:ext uri="{FF2B5EF4-FFF2-40B4-BE49-F238E27FC236}">
-                <a16:creationId xmlns:a16="http://schemas.microsoft.com/office/drawing/2014/main" id="{DA033781-73AE-4324-9157-FD49DA1BBC42}"/>
+                <a16:creationId xmlns:a16="http://schemas.microsoft.com/office/drawing/2014/main" id="{E4D55780-BE5D-4F93-9E2A-297CF30D494C}"/>
               </a:ext>
             </a:extLst>
           </p:cNvPr>
@@ -2196,7 +2196,7 @@
           <p:cNvPr id="3" name="Content Placeholder 2">
             <a:extLst>
               <a:ext uri="{FF2B5EF4-FFF2-40B4-BE49-F238E27FC236}">
-                <a16:creationId xmlns:a16="http://schemas.microsoft.com/office/drawing/2014/main" id="{B8066B54-B706-4942-BE89-C95242FF9343}"/>
+                <a16:creationId xmlns:a16="http://schemas.microsoft.com/office/drawing/2014/main" id="{DD18DB42-6E5A-41AD-9DD3-F8E79CAADC8F}"/>
               </a:ext>
             </a:extLst>
           </p:cNvPr>
@@ -2286,7 +2286,7 @@
           <p:cNvPr id="4" name="Text Placeholder 3">
             <a:extLst>
               <a:ext uri="{FF2B5EF4-FFF2-40B4-BE49-F238E27FC236}">
-                <a16:creationId xmlns:a16="http://schemas.microsoft.com/office/drawing/2014/main" id="{C358BCF5-97C2-4836-B11A-5D3C395AECBC}"/>
+                <a16:creationId xmlns:a16="http://schemas.microsoft.com/office/drawing/2014/main" id="{4D339471-F0E3-4E0F-A307-AE7D9842E719}"/>
               </a:ext>
             </a:extLst>
           </p:cNvPr>
@@ -2357,7 +2357,7 @@
           <p:cNvPr id="5" name="Date Placeholder 4">
             <a:extLst>
               <a:ext uri="{FF2B5EF4-FFF2-40B4-BE49-F238E27FC236}">
-                <a16:creationId xmlns:a16="http://schemas.microsoft.com/office/drawing/2014/main" id="{4A9345D3-4180-49ED-8708-C162901F6DD4}"/>
+                <a16:creationId xmlns:a16="http://schemas.microsoft.com/office/drawing/2014/main" id="{85A5A935-BBBE-4FFE-ABF5-EC21D2E1BD9C}"/>
               </a:ext>
             </a:extLst>
           </p:cNvPr>
@@ -2373,9 +2373,9 @@
           <a:bodyPr/>
           <a:lstStyle/>
           <a:p>
-            <a:fld id="{69964482-7A28-46BB-911B-C4295E5B9189}" type="datetimeFigureOut">
+            <a:fld id="{0BB7F5F2-C89A-42B0-A48D-799E2B27853F}" type="datetimeFigureOut">
               <a:rPr lang="en-US" smtClean="0"/>
-              <a:t>11/19/2021</a:t>
+              <a:t>11/22/2021</a:t>
             </a:fld>
             <a:endParaRPr lang="en-US"/>
           </a:p>
@@ -2386,7 +2386,7 @@
           <p:cNvPr id="6" name="Footer Placeholder 5">
             <a:extLst>
               <a:ext uri="{FF2B5EF4-FFF2-40B4-BE49-F238E27FC236}">
-                <a16:creationId xmlns:a16="http://schemas.microsoft.com/office/drawing/2014/main" id="{117503EF-681D-459D-A15B-2FC5200AEAC1}"/>
+                <a16:creationId xmlns:a16="http://schemas.microsoft.com/office/drawing/2014/main" id="{8A69C122-96E4-4AD8-BF1D-43FC8D22DEFB}"/>
               </a:ext>
             </a:extLst>
           </p:cNvPr>
@@ -2411,7 +2411,7 @@
           <p:cNvPr id="7" name="Slide Number Placeholder 6">
             <a:extLst>
               <a:ext uri="{FF2B5EF4-FFF2-40B4-BE49-F238E27FC236}">
-                <a16:creationId xmlns:a16="http://schemas.microsoft.com/office/drawing/2014/main" id="{D4C5636F-578E-4071-8CB5-1915B8E25F7B}"/>
+                <a16:creationId xmlns:a16="http://schemas.microsoft.com/office/drawing/2014/main" id="{28F01327-9AAE-4E8A-9464-D8B1BCADE2A3}"/>
               </a:ext>
             </a:extLst>
           </p:cNvPr>
@@ -2427,7 +2427,7 @@
           <a:bodyPr/>
           <a:lstStyle/>
           <a:p>
-            <a:fld id="{49FB7405-2293-4647-B9E0-98495B39DEC9}" type="slidenum">
+            <a:fld id="{C189D780-3667-48AA-8D4E-FC9525966740}" type="slidenum">
               <a:rPr lang="en-US" smtClean="0"/>
               <a:t>‹#›</a:t>
             </a:fld>
@@ -2438,7 +2438,7 @@
     </p:spTree>
     <p:extLst>
       <p:ext uri="{BB962C8B-B14F-4D97-AF65-F5344CB8AC3E}">
-        <p14:creationId xmlns:p14="http://schemas.microsoft.com/office/powerpoint/2010/main" val="148348763"/>
+        <p14:creationId xmlns:p14="http://schemas.microsoft.com/office/powerpoint/2010/main" val="2315962013"/>
       </p:ext>
     </p:extLst>
   </p:cSld>
@@ -2470,7 +2470,7 @@
           <p:cNvPr id="2" name="Title 1">
             <a:extLst>
               <a:ext uri="{FF2B5EF4-FFF2-40B4-BE49-F238E27FC236}">
-                <a16:creationId xmlns:a16="http://schemas.microsoft.com/office/drawing/2014/main" id="{C0E1D29A-AED2-440D-9E16-8888F818BD33}"/>
+                <a16:creationId xmlns:a16="http://schemas.microsoft.com/office/drawing/2014/main" id="{8D251057-238F-4B25-BCD4-B7EAEF469917}"/>
               </a:ext>
             </a:extLst>
           </p:cNvPr>
@@ -2507,7 +2507,7 @@
           <p:cNvPr id="3" name="Picture Placeholder 2">
             <a:extLst>
               <a:ext uri="{FF2B5EF4-FFF2-40B4-BE49-F238E27FC236}">
-                <a16:creationId xmlns:a16="http://schemas.microsoft.com/office/drawing/2014/main" id="{1CCC7FA7-62A4-4961-BEE9-03AEF71FD485}"/>
+                <a16:creationId xmlns:a16="http://schemas.microsoft.com/office/drawing/2014/main" id="{05EB7302-5999-41BF-BA3D-D25E42EF4524}"/>
               </a:ext>
             </a:extLst>
           </p:cNvPr>
@@ -2574,7 +2574,7 @@
           <p:cNvPr id="4" name="Text Placeholder 3">
             <a:extLst>
               <a:ext uri="{FF2B5EF4-FFF2-40B4-BE49-F238E27FC236}">
-                <a16:creationId xmlns:a16="http://schemas.microsoft.com/office/drawing/2014/main" id="{BEB5A028-FFCB-440B-B2FF-B768A5B4B594}"/>
+                <a16:creationId xmlns:a16="http://schemas.microsoft.com/office/drawing/2014/main" id="{E2AA797C-5045-4A5E-A889-E0BB38360F7D}"/>
               </a:ext>
             </a:extLst>
           </p:cNvPr>
@@ -2645,7 +2645,7 @@
           <p:cNvPr id="5" name="Date Placeholder 4">
             <a:extLst>
               <a:ext uri="{FF2B5EF4-FFF2-40B4-BE49-F238E27FC236}">
-                <a16:creationId xmlns:a16="http://schemas.microsoft.com/office/drawing/2014/main" id="{F9183938-0B25-4E36-8904-FA6C69D491D6}"/>
+                <a16:creationId xmlns:a16="http://schemas.microsoft.com/office/drawing/2014/main" id="{A80C4681-05B0-426E-A7B6-F07F3E1C79BB}"/>
               </a:ext>
             </a:extLst>
           </p:cNvPr>
@@ -2661,9 +2661,9 @@
           <a:bodyPr/>
           <a:lstStyle/>
           <a:p>
-            <a:fld id="{69964482-7A28-46BB-911B-C4295E5B9189}" type="datetimeFigureOut">
+            <a:fld id="{0BB7F5F2-C89A-42B0-A48D-799E2B27853F}" type="datetimeFigureOut">
               <a:rPr lang="en-US" smtClean="0"/>
-              <a:t>11/19/2021</a:t>
+              <a:t>11/22/2021</a:t>
             </a:fld>
             <a:endParaRPr lang="en-US"/>
           </a:p>
@@ -2674,7 +2674,7 @@
           <p:cNvPr id="6" name="Footer Placeholder 5">
             <a:extLst>
               <a:ext uri="{FF2B5EF4-FFF2-40B4-BE49-F238E27FC236}">
-                <a16:creationId xmlns:a16="http://schemas.microsoft.com/office/drawing/2014/main" id="{FA96502E-559F-4C8B-97A1-C787B8105C64}"/>
+                <a16:creationId xmlns:a16="http://schemas.microsoft.com/office/drawing/2014/main" id="{E8ED6946-2EF3-4865-83ED-0E161B507670}"/>
               </a:ext>
             </a:extLst>
           </p:cNvPr>
@@ -2699,7 +2699,7 @@
           <p:cNvPr id="7" name="Slide Number Placeholder 6">
             <a:extLst>
               <a:ext uri="{FF2B5EF4-FFF2-40B4-BE49-F238E27FC236}">
-                <a16:creationId xmlns:a16="http://schemas.microsoft.com/office/drawing/2014/main" id="{BE8B087E-922C-45F7-BF67-45ADE6A30FFE}"/>
+                <a16:creationId xmlns:a16="http://schemas.microsoft.com/office/drawing/2014/main" id="{6D799418-4EFF-44EE-A2B5-D44CF25D734A}"/>
               </a:ext>
             </a:extLst>
           </p:cNvPr>
@@ -2715,7 +2715,7 @@
           <a:bodyPr/>
           <a:lstStyle/>
           <a:p>
-            <a:fld id="{49FB7405-2293-4647-B9E0-98495B39DEC9}" type="slidenum">
+            <a:fld id="{C189D780-3667-48AA-8D4E-FC9525966740}" type="slidenum">
               <a:rPr lang="en-US" smtClean="0"/>
               <a:t>‹#›</a:t>
             </a:fld>
@@ -2726,7 +2726,7 @@
     </p:spTree>
     <p:extLst>
       <p:ext uri="{BB962C8B-B14F-4D97-AF65-F5344CB8AC3E}">
-        <p14:creationId xmlns:p14="http://schemas.microsoft.com/office/powerpoint/2010/main" val="4036174920"/>
+        <p14:creationId xmlns:p14="http://schemas.microsoft.com/office/powerpoint/2010/main" val="2019574234"/>
       </p:ext>
     </p:extLst>
   </p:cSld>
@@ -2763,7 +2763,7 @@
           <p:cNvPr id="2" name="Title Placeholder 1">
             <a:extLst>
               <a:ext uri="{FF2B5EF4-FFF2-40B4-BE49-F238E27FC236}">
-                <a16:creationId xmlns:a16="http://schemas.microsoft.com/office/drawing/2014/main" id="{86AD7569-9DFE-4426-85F2-4FE6F39EA6D8}"/>
+                <a16:creationId xmlns:a16="http://schemas.microsoft.com/office/drawing/2014/main" id="{A76A1208-D7B5-4B35-903C-91141FBCBEE9}"/>
               </a:ext>
             </a:extLst>
           </p:cNvPr>
@@ -2801,7 +2801,7 @@
           <p:cNvPr id="3" name="Text Placeholder 2">
             <a:extLst>
               <a:ext uri="{FF2B5EF4-FFF2-40B4-BE49-F238E27FC236}">
-                <a16:creationId xmlns:a16="http://schemas.microsoft.com/office/drawing/2014/main" id="{C471DF65-0A21-4C6E-A6D3-F119B9700EA6}"/>
+                <a16:creationId xmlns:a16="http://schemas.microsoft.com/office/drawing/2014/main" id="{12740527-B5FA-4F4F-B7F8-9C6B3F5C10A7}"/>
               </a:ext>
             </a:extLst>
           </p:cNvPr>
@@ -2868,7 +2868,7 @@
           <p:cNvPr id="4" name="Date Placeholder 3">
             <a:extLst>
               <a:ext uri="{FF2B5EF4-FFF2-40B4-BE49-F238E27FC236}">
-                <a16:creationId xmlns:a16="http://schemas.microsoft.com/office/drawing/2014/main" id="{F02CAE3F-646F-4E7E-91E7-8B8FB2BFB1D6}"/>
+                <a16:creationId xmlns:a16="http://schemas.microsoft.com/office/drawing/2014/main" id="{45BA6CF6-FE7C-4C34-BD30-173FF520CC3A}"/>
               </a:ext>
             </a:extLst>
           </p:cNvPr>
@@ -2902,9 +2902,9 @@
             </a:lvl1pPr>
           </a:lstStyle>
           <a:p>
-            <a:fld id="{69964482-7A28-46BB-911B-C4295E5B9189}" type="datetimeFigureOut">
+            <a:fld id="{0BB7F5F2-C89A-42B0-A48D-799E2B27853F}" type="datetimeFigureOut">
               <a:rPr lang="en-US" smtClean="0"/>
-              <a:t>11/19/2021</a:t>
+              <a:t>11/22/2021</a:t>
             </a:fld>
             <a:endParaRPr lang="en-US"/>
           </a:p>
@@ -2915,7 +2915,7 @@
           <p:cNvPr id="5" name="Footer Placeholder 4">
             <a:extLst>
               <a:ext uri="{FF2B5EF4-FFF2-40B4-BE49-F238E27FC236}">
-                <a16:creationId xmlns:a16="http://schemas.microsoft.com/office/drawing/2014/main" id="{0DCC3BAB-7DBD-47A1-BFDE-B73532BCB916}"/>
+                <a16:creationId xmlns:a16="http://schemas.microsoft.com/office/drawing/2014/main" id="{0CFB8A61-D4B2-4032-8A5F-31FE2EB22AD8}"/>
               </a:ext>
             </a:extLst>
           </p:cNvPr>
@@ -2958,7 +2958,7 @@
           <p:cNvPr id="6" name="Slide Number Placeholder 5">
             <a:extLst>
               <a:ext uri="{FF2B5EF4-FFF2-40B4-BE49-F238E27FC236}">
-                <a16:creationId xmlns:a16="http://schemas.microsoft.com/office/drawing/2014/main" id="{768F6EDE-096C-4E53-92E6-1A81F2234B0A}"/>
+                <a16:creationId xmlns:a16="http://schemas.microsoft.com/office/drawing/2014/main" id="{FE918026-80F2-482E-AB05-BC84288C8CA4}"/>
               </a:ext>
             </a:extLst>
           </p:cNvPr>
@@ -2992,7 +2992,7 @@
             </a:lvl1pPr>
           </a:lstStyle>
           <a:p>
-            <a:fld id="{49FB7405-2293-4647-B9E0-98495B39DEC9}" type="slidenum">
+            <a:fld id="{C189D780-3667-48AA-8D4E-FC9525966740}" type="slidenum">
               <a:rPr lang="en-US" smtClean="0"/>
               <a:t>‹#›</a:t>
             </a:fld>
@@ -3003,7 +3003,7 @@
     </p:spTree>
     <p:extLst>
       <p:ext uri="{BB962C8B-B14F-4D97-AF65-F5344CB8AC3E}">
-        <p14:creationId xmlns:p14="http://schemas.microsoft.com/office/powerpoint/2010/main" val="3311902710"/>
+        <p14:creationId xmlns:p14="http://schemas.microsoft.com/office/powerpoint/2010/main" val="2501297775"/>
       </p:ext>
     </p:extLst>
   </p:cSld>
@@ -3326,7 +3326,7 @@
           <p:cNvPr id="4" name="Rectangle: Rounded Corners 3">
             <a:extLst>
               <a:ext uri="{FF2B5EF4-FFF2-40B4-BE49-F238E27FC236}">
-                <a16:creationId xmlns:a16="http://schemas.microsoft.com/office/drawing/2014/main" id="{78AB701F-43C4-46FB-BF01-2CEF3CED6565}"/>
+                <a16:creationId xmlns:a16="http://schemas.microsoft.com/office/drawing/2014/main" id="{C51820B0-4C13-4B70-BEDC-0F26B5F560DB}"/>
               </a:ext>
             </a:extLst>
           </p:cNvPr>
@@ -3335,25 +3335,30 @@
         </p:nvSpPr>
         <p:spPr>
           <a:xfrm>
-            <a:off x="2474843" y="1958009"/>
-            <a:ext cx="3190461" cy="2454965"/>
+            <a:off x="1451113" y="1729409"/>
+            <a:ext cx="3150704" cy="2415208"/>
           </a:xfrm>
           <a:prstGeom prst="roundRect">
             <a:avLst/>
           </a:prstGeom>
+          <a:solidFill>
+            <a:schemeClr val="bg1"/>
+          </a:solidFill>
         </p:spPr>
         <p:style>
           <a:lnRef idx="2">
-            <a:schemeClr val="accent1"/>
+            <a:schemeClr val="accent1">
+              <a:shade val="50000"/>
+            </a:schemeClr>
           </a:lnRef>
           <a:fillRef idx="1">
-            <a:schemeClr val="lt1"/>
+            <a:schemeClr val="accent1"/>
           </a:fillRef>
           <a:effectRef idx="0">
             <a:schemeClr val="accent1"/>
           </a:effectRef>
           <a:fontRef idx="minor">
-            <a:schemeClr val="dk1"/>
+            <a:schemeClr val="lt1"/>
           </a:fontRef>
         </p:style>
         <p:txBody>
@@ -3364,10 +3369,13 @@
             <a:r>
               <a:rPr lang="en-US" dirty="0">
                 <a:solidFill>
-                  <a:schemeClr val="accent1"/>
+                  <a:schemeClr val="accent1">
+                    <a:lumMod val="60000"/>
+                    <a:lumOff val="40000"/>
+                  </a:schemeClr>
                 </a:solidFill>
               </a:rPr>
-              <a:t>blue</a:t>
+              <a:t>Blue, Accent 1, Lighter 40%</a:t>
             </a:r>
           </a:p>
         </p:txBody>
@@ -3375,7 +3383,7 @@
     </p:spTree>
     <p:extLst>
       <p:ext uri="{BB962C8B-B14F-4D97-AF65-F5344CB8AC3E}">
-        <p14:creationId xmlns:p14="http://schemas.microsoft.com/office/powerpoint/2010/main" val="4177190961"/>
+        <p14:creationId xmlns:p14="http://schemas.microsoft.com/office/powerpoint/2010/main" val="1928930834"/>
       </p:ext>
     </p:extLst>
   </p:cSld>

</xml_diff>